<commit_message>
fix subl link for mac
</commit_message>
<xml_diff>
--- a/Slides/Lesson4.pptx
+++ b/Slides/Lesson4.pptx
@@ -259,7 +259,7 @@
           <a:p>
             <a:fld id="{3DC938F6-68C4-0047-B1AE-0108D29A9035}" type="datetimeFigureOut">
               <a:rPr lang="en-US" smtClean="0"/>
-              <a:t>2/2/16</a:t>
+              <a:t>2/7/16</a:t>
             </a:fld>
             <a:endParaRPr lang="en-US"/>
           </a:p>
@@ -429,7 +429,7 @@
           <a:p>
             <a:fld id="{3DC938F6-68C4-0047-B1AE-0108D29A9035}" type="datetimeFigureOut">
               <a:rPr lang="en-US" smtClean="0"/>
-              <a:t>2/2/16</a:t>
+              <a:t>2/7/16</a:t>
             </a:fld>
             <a:endParaRPr lang="en-US"/>
           </a:p>
@@ -609,7 +609,7 @@
           <a:p>
             <a:fld id="{3DC938F6-68C4-0047-B1AE-0108D29A9035}" type="datetimeFigureOut">
               <a:rPr lang="en-US" smtClean="0"/>
-              <a:t>2/2/16</a:t>
+              <a:t>2/7/16</a:t>
             </a:fld>
             <a:endParaRPr lang="en-US"/>
           </a:p>
@@ -779,7 +779,7 @@
           <a:p>
             <a:fld id="{3DC938F6-68C4-0047-B1AE-0108D29A9035}" type="datetimeFigureOut">
               <a:rPr lang="en-US" smtClean="0"/>
-              <a:t>2/2/16</a:t>
+              <a:t>2/7/16</a:t>
             </a:fld>
             <a:endParaRPr lang="en-US"/>
           </a:p>
@@ -1025,7 +1025,7 @@
           <a:p>
             <a:fld id="{3DC938F6-68C4-0047-B1AE-0108D29A9035}" type="datetimeFigureOut">
               <a:rPr lang="en-US" smtClean="0"/>
-              <a:t>2/2/16</a:t>
+              <a:t>2/7/16</a:t>
             </a:fld>
             <a:endParaRPr lang="en-US"/>
           </a:p>
@@ -1257,7 +1257,7 @@
           <a:p>
             <a:fld id="{3DC938F6-68C4-0047-B1AE-0108D29A9035}" type="datetimeFigureOut">
               <a:rPr lang="en-US" smtClean="0"/>
-              <a:t>2/2/16</a:t>
+              <a:t>2/7/16</a:t>
             </a:fld>
             <a:endParaRPr lang="en-US"/>
           </a:p>
@@ -1624,7 +1624,7 @@
           <a:p>
             <a:fld id="{3DC938F6-68C4-0047-B1AE-0108D29A9035}" type="datetimeFigureOut">
               <a:rPr lang="en-US" smtClean="0"/>
-              <a:t>2/2/16</a:t>
+              <a:t>2/7/16</a:t>
             </a:fld>
             <a:endParaRPr lang="en-US"/>
           </a:p>
@@ -1742,7 +1742,7 @@
           <a:p>
             <a:fld id="{3DC938F6-68C4-0047-B1AE-0108D29A9035}" type="datetimeFigureOut">
               <a:rPr lang="en-US" smtClean="0"/>
-              <a:t>2/2/16</a:t>
+              <a:t>2/7/16</a:t>
             </a:fld>
             <a:endParaRPr lang="en-US"/>
           </a:p>
@@ -1837,7 +1837,7 @@
           <a:p>
             <a:fld id="{3DC938F6-68C4-0047-B1AE-0108D29A9035}" type="datetimeFigureOut">
               <a:rPr lang="en-US" smtClean="0"/>
-              <a:t>2/2/16</a:t>
+              <a:t>2/7/16</a:t>
             </a:fld>
             <a:endParaRPr lang="en-US"/>
           </a:p>
@@ -2114,7 +2114,7 @@
           <a:p>
             <a:fld id="{3DC938F6-68C4-0047-B1AE-0108D29A9035}" type="datetimeFigureOut">
               <a:rPr lang="en-US" smtClean="0"/>
-              <a:t>2/2/16</a:t>
+              <a:t>2/7/16</a:t>
             </a:fld>
             <a:endParaRPr lang="en-US"/>
           </a:p>
@@ -2367,7 +2367,7 @@
           <a:p>
             <a:fld id="{3DC938F6-68C4-0047-B1AE-0108D29A9035}" type="datetimeFigureOut">
               <a:rPr lang="en-US" smtClean="0"/>
-              <a:t>2/2/16</a:t>
+              <a:t>2/7/16</a:t>
             </a:fld>
             <a:endParaRPr lang="en-US"/>
           </a:p>
@@ -2580,7 +2580,7 @@
           <a:p>
             <a:fld id="{3DC938F6-68C4-0047-B1AE-0108D29A9035}" type="datetimeFigureOut">
               <a:rPr lang="en-US" smtClean="0"/>
-              <a:t>2/2/16</a:t>
+              <a:t>2/7/16</a:t>
             </a:fld>
             <a:endParaRPr lang="en-US"/>
           </a:p>
@@ -3183,13 +3183,13 @@
           <p:nvPr>
             <p:extLst>
               <p:ext uri="{D42A27DB-BD31-4B8C-83A1-F6EECF244321}">
-                <p14:modId xmlns:p14="http://schemas.microsoft.com/office/powerpoint/2010/main" val="137786806"/>
+                <p14:modId xmlns:p14="http://schemas.microsoft.com/office/powerpoint/2010/main" val="1271039067"/>
               </p:ext>
             </p:extLst>
           </p:nvPr>
         </p:nvGraphicFramePr>
         <p:xfrm>
-          <a:off x="692430" y="4001294"/>
+          <a:off x="692430" y="4034544"/>
           <a:ext cx="9498494" cy="741680"/>
         </p:xfrm>
         <a:graphic>
@@ -4812,11 +4812,7 @@
           <a:p>
             <a:r>
               <a:rPr lang="en-US" dirty="0" smtClean="0"/>
-              <a:t>We can do it for a program too </a:t>
-            </a:r>
-            <a:r>
-              <a:rPr lang="en-US" dirty="0" smtClean="0"/>
-              <a:t>!</a:t>
+              <a:t>We can do it for a program too !</a:t>
             </a:r>
           </a:p>
           <a:p>
@@ -4993,11 +4989,6 @@
               </a:rPr>
               <a:t>(“hello”);	</a:t>
             </a:r>
-            <a:endParaRPr lang="en-US" dirty="0" smtClean="0">
-              <a:latin typeface="Courier" charset="0"/>
-              <a:ea typeface="Courier" charset="0"/>
-              <a:cs typeface="Courier" charset="0"/>
-            </a:endParaRPr>
           </a:p>
           <a:p>
             <a:pPr marL="0" indent="0">
@@ -5019,11 +5010,6 @@
               </a:rPr>
               <a:t>	</a:t>
             </a:r>
-            <a:endParaRPr lang="en-US" dirty="0" smtClean="0">
-              <a:latin typeface="Courier" charset="0"/>
-              <a:ea typeface="Courier" charset="0"/>
-              <a:cs typeface="Courier" charset="0"/>
-            </a:endParaRPr>
           </a:p>
           <a:p>
             <a:pPr marL="0" indent="0">
@@ -5637,7 +5623,6 @@
               <a:rPr lang="en-US" dirty="0" smtClean="0"/>
               <a:t>See the skeleton in strlen2.c</a:t>
             </a:r>
-            <a:endParaRPr lang="en-US" dirty="0" smtClean="0"/>
           </a:p>
           <a:p>
             <a:endParaRPr lang="en-US" dirty="0"/>
@@ -5950,9 +5935,26 @@
           </a:p>
           <a:p>
             <a:r>
+              <a:rPr lang="en-US" dirty="0" smtClean="0"/>
+              <a:t>Windows</a:t>
+            </a:r>
+            <a:r>
               <a:rPr lang="en-US" dirty="0"/>
-              <a:t>Windows: </a:t>
-            </a:r>
+              <a:t> </a:t>
+            </a:r>
+            <a:r>
+              <a:rPr lang="en-US" dirty="0" smtClean="0"/>
+              <a:t>on the “</a:t>
+            </a:r>
+            <a:r>
+              <a:rPr lang="en-US" dirty="0" err="1" smtClean="0"/>
+              <a:t>cygwin</a:t>
+            </a:r>
+            <a:r>
+              <a:rPr lang="en-US" dirty="0" smtClean="0"/>
+              <a:t> Terminal”:</a:t>
+            </a:r>
+            <a:endParaRPr lang="en-US" dirty="0"/>
           </a:p>
           <a:p>
             <a:pPr marL="0" indent="0">
@@ -6053,10 +6055,18 @@
                 <a:ea typeface="Consolas" charset="0"/>
                 <a:cs typeface="Consolas" charset="0"/>
               </a:rPr>
-              <a:t>ln -s "/Applications/Sublime Text 2.app/Contents/</a:t>
-            </a:r>
-            <a:r>
-              <a:rPr lang="en-US" b="1" dirty="0" err="1">
+              <a:t>ln -s "/Applications/Sublime Text </a:t>
+            </a:r>
+            <a:r>
+              <a:rPr lang="en-US" b="1" dirty="0" smtClean="0">
+                <a:latin typeface="Consolas" charset="0"/>
+                <a:ea typeface="Consolas" charset="0"/>
+                <a:cs typeface="Consolas" charset="0"/>
+              </a:rPr>
+              <a:t>2.app/Contents/</a:t>
+            </a:r>
+            <a:r>
+              <a:rPr lang="en-US" b="1" dirty="0" err="1" smtClean="0">
                 <a:latin typeface="Consolas" charset="0"/>
                 <a:ea typeface="Consolas" charset="0"/>
                 <a:cs typeface="Consolas" charset="0"/>
@@ -6064,7 +6074,7 @@
               <a:t>SharedSupport</a:t>
             </a:r>
             <a:r>
-              <a:rPr lang="en-US" b="1" dirty="0">
+              <a:rPr lang="en-US" b="1" dirty="0" smtClean="0">
                 <a:latin typeface="Consolas" charset="0"/>
                 <a:ea typeface="Consolas" charset="0"/>
                 <a:cs typeface="Consolas" charset="0"/>
@@ -6072,7 +6082,7 @@
               <a:t>/bin/</a:t>
             </a:r>
             <a:r>
-              <a:rPr lang="en-US" b="1" dirty="0" err="1">
+              <a:rPr lang="en-US" b="1" dirty="0" err="1" smtClean="0">
                 <a:solidFill>
                   <a:srgbClr val="FF0000"/>
                 </a:solidFill>
@@ -6083,20 +6093,28 @@
               <a:t>subl</a:t>
             </a:r>
             <a:r>
-              <a:rPr lang="en-US" b="1" dirty="0">
-                <a:latin typeface="Consolas" charset="0"/>
-                <a:ea typeface="Consolas" charset="0"/>
-                <a:cs typeface="Consolas" charset="0"/>
-              </a:rPr>
-              <a:t>" </a:t>
-            </a:r>
-            <a:r>
               <a:rPr lang="en-US" b="1" dirty="0" smtClean="0">
                 <a:latin typeface="Consolas" charset="0"/>
                 <a:ea typeface="Consolas" charset="0"/>
                 <a:cs typeface="Consolas" charset="0"/>
               </a:rPr>
-              <a:t>~/bin/</a:t>
+              <a:t>” /</a:t>
+            </a:r>
+            <a:r>
+              <a:rPr lang="en-US" b="1" dirty="0" err="1" smtClean="0">
+                <a:latin typeface="Consolas" charset="0"/>
+                <a:ea typeface="Consolas" charset="0"/>
+                <a:cs typeface="Consolas" charset="0"/>
+              </a:rPr>
+              <a:t>usr</a:t>
+            </a:r>
+            <a:r>
+              <a:rPr lang="en-US" b="1" smtClean="0">
+                <a:latin typeface="Consolas" charset="0"/>
+                <a:ea typeface="Consolas" charset="0"/>
+                <a:cs typeface="Consolas" charset="0"/>
+              </a:rPr>
+              <a:t>/local/bin/</a:t>
             </a:r>
             <a:r>
               <a:rPr lang="en-US" b="1" dirty="0" err="1" smtClean="0">
@@ -6298,11 +6316,7 @@
             </a:r>
             <a:r>
               <a:rPr lang="en-US" dirty="0" smtClean="0"/>
-              <a:t> grades[10</a:t>
-            </a:r>
-            <a:r>
-              <a:rPr lang="en-US" dirty="0" smtClean="0"/>
-              <a:t>];</a:t>
+              <a:t> grades[10];</a:t>
             </a:r>
           </a:p>
           <a:p>
@@ -6313,15 +6327,7 @@
             </a:r>
             <a:r>
               <a:rPr lang="en-US" dirty="0" smtClean="0"/>
-              <a:t>har </a:t>
-            </a:r>
-            <a:r>
-              <a:rPr lang="en-US" dirty="0" smtClean="0"/>
-              <a:t>string[10</a:t>
-            </a:r>
-            <a:r>
-              <a:rPr lang="en-US" dirty="0" smtClean="0"/>
-              <a:t>];</a:t>
+              <a:t>har string[10];</a:t>
             </a:r>
           </a:p>
           <a:p>
@@ -6330,15 +6336,7 @@
           <a:p>
             <a:r>
               <a:rPr lang="en-US" dirty="0" smtClean="0"/>
-              <a:t>The </a:t>
-            </a:r>
-            <a:r>
-              <a:rPr lang="en-US" dirty="0" smtClean="0"/>
-              <a:t>index always starts at </a:t>
-            </a:r>
-            <a:r>
-              <a:rPr lang="en-US" dirty="0" smtClean="0"/>
-              <a:t>0</a:t>
+              <a:t>The index always starts at 0</a:t>
             </a:r>
           </a:p>
           <a:p>

</xml_diff>